<commit_message>
New implicit typing slides
</commit_message>
<xml_diff>
--- a/ClassMaterials/ImplicitTyping/ImplicitTyping.pptx
+++ b/ClassMaterials/ImplicitTyping/ImplicitTyping.pptx
@@ -130,7 +130,7 @@
 <file path=ppt/revisionInfo.xml><?xml version="1.0" encoding="utf-8"?>
 <p1510:revInfo xmlns:a="http://schemas.openxmlformats.org/drawingml/2006/main" xmlns:r="http://schemas.openxmlformats.org/officeDocument/2006/relationships" xmlns:p1510="http://schemas.microsoft.com/office/powerpoint/2015/10/main">
   <p1510:revLst>
-    <p1510:client id="{416766A8-B8B6-4097-89A9-FC77923FB253}" v="27" dt="2022-11-02T20:36:51.725"/>
+    <p1510:client id="{7E3A4137-9A4A-4C26-BB89-E50CDB793210}" v="3" dt="2023-02-13T16:15:00.283"/>
   </p1510:revLst>
 </p1510:revInfo>
 </file>
@@ -203,6 +203,61 @@
             <ac:graphicFrameMk id="5" creationId="{EB12422E-7D07-ABE2-7B68-B6B1231DAB1E}"/>
           </ac:graphicFrameMkLst>
         </pc:graphicFrameChg>
+      </pc:sldChg>
+    </pc:docChg>
+  </pc:docChgLst>
+  <pc:docChgLst>
+    <pc:chgData name="Hewner, Mike" userId="7f3f83dd-6dfb-4127-a87f-c1714bd4fac9" providerId="ADAL" clId="{7E3A4137-9A4A-4C26-BB89-E50CDB793210}"/>
+    <pc:docChg chg="custSel modSld">
+      <pc:chgData name="Hewner, Mike" userId="7f3f83dd-6dfb-4127-a87f-c1714bd4fac9" providerId="ADAL" clId="{7E3A4137-9A4A-4C26-BB89-E50CDB793210}" dt="2023-02-13T16:22:23.441" v="546" actId="20577"/>
+      <pc:docMkLst>
+        <pc:docMk/>
+      </pc:docMkLst>
+      <pc:sldChg chg="addSp delSp modSp mod">
+        <pc:chgData name="Hewner, Mike" userId="7f3f83dd-6dfb-4127-a87f-c1714bd4fac9" providerId="ADAL" clId="{7E3A4137-9A4A-4C26-BB89-E50CDB793210}" dt="2023-02-13T16:17:46.368" v="162" actId="113"/>
+        <pc:sldMkLst>
+          <pc:docMk/>
+          <pc:sldMk cId="1080743592" sldId="268"/>
+        </pc:sldMkLst>
+        <pc:spChg chg="mod">
+          <ac:chgData name="Hewner, Mike" userId="7f3f83dd-6dfb-4127-a87f-c1714bd4fac9" providerId="ADAL" clId="{7E3A4137-9A4A-4C26-BB89-E50CDB793210}" dt="2023-02-13T16:11:46.828" v="52" actId="14100"/>
+          <ac:spMkLst>
+            <pc:docMk/>
+            <pc:sldMk cId="1080743592" sldId="268"/>
+            <ac:spMk id="2" creationId="{E864F236-8C2E-3A2D-94C7-059C676E010D}"/>
+          </ac:spMkLst>
+        </pc:spChg>
+        <pc:spChg chg="mod">
+          <ac:chgData name="Hewner, Mike" userId="7f3f83dd-6dfb-4127-a87f-c1714bd4fac9" providerId="ADAL" clId="{7E3A4137-9A4A-4C26-BB89-E50CDB793210}" dt="2023-02-13T16:17:46.368" v="162" actId="113"/>
+          <ac:spMkLst>
+            <pc:docMk/>
+            <pc:sldMk cId="1080743592" sldId="268"/>
+            <ac:spMk id="3" creationId="{BECA4197-2848-2EB6-82C1-F0861F2CAF7C}"/>
+          </ac:spMkLst>
+        </pc:spChg>
+        <pc:graphicFrameChg chg="add del mod">
+          <ac:chgData name="Hewner, Mike" userId="7f3f83dd-6dfb-4127-a87f-c1714bd4fac9" providerId="ADAL" clId="{7E3A4137-9A4A-4C26-BB89-E50CDB793210}" dt="2023-02-13T16:14:50.587" v="57"/>
+          <ac:graphicFrameMkLst>
+            <pc:docMk/>
+            <pc:sldMk cId="1080743592" sldId="268"/>
+            <ac:graphicFrameMk id="4" creationId="{C0F501E1-ADC8-E866-3B12-15336633F88E}"/>
+          </ac:graphicFrameMkLst>
+        </pc:graphicFrameChg>
+      </pc:sldChg>
+      <pc:sldChg chg="modSp mod">
+        <pc:chgData name="Hewner, Mike" userId="7f3f83dd-6dfb-4127-a87f-c1714bd4fac9" providerId="ADAL" clId="{7E3A4137-9A4A-4C26-BB89-E50CDB793210}" dt="2023-02-13T16:22:23.441" v="546" actId="20577"/>
+        <pc:sldMkLst>
+          <pc:docMk/>
+          <pc:sldMk cId="3831275875" sldId="270"/>
+        </pc:sldMkLst>
+        <pc:spChg chg="mod">
+          <ac:chgData name="Hewner, Mike" userId="7f3f83dd-6dfb-4127-a87f-c1714bd4fac9" providerId="ADAL" clId="{7E3A4137-9A4A-4C26-BB89-E50CDB793210}" dt="2023-02-13T16:22:23.441" v="546" actId="20577"/>
+          <ac:spMkLst>
+            <pc:docMk/>
+            <pc:sldMk cId="3831275875" sldId="270"/>
+            <ac:spMk id="3" creationId="{81A80C4D-8E56-A0B8-7B9E-C582008E78C7}"/>
+          </ac:spMkLst>
+        </pc:spChg>
       </pc:sldChg>
     </pc:docChg>
   </pc:docChgLst>
@@ -843,7 +898,7 @@
           <a:p>
             <a:fld id="{7278FE79-C10B-4710-88A9-F314B59049B5}" type="datetimeFigureOut">
               <a:rPr lang="en-US" smtClean="0"/>
-              <a:t>11/4/2022</a:t>
+              <a:t>2/13/2023</a:t>
             </a:fld>
             <a:endParaRPr lang="en-US"/>
           </a:p>
@@ -1041,7 +1096,7 @@
           <a:p>
             <a:fld id="{7278FE79-C10B-4710-88A9-F314B59049B5}" type="datetimeFigureOut">
               <a:rPr lang="en-US" smtClean="0"/>
-              <a:t>11/4/2022</a:t>
+              <a:t>2/13/2023</a:t>
             </a:fld>
             <a:endParaRPr lang="en-US"/>
           </a:p>
@@ -1249,7 +1304,7 @@
           <a:p>
             <a:fld id="{7278FE79-C10B-4710-88A9-F314B59049B5}" type="datetimeFigureOut">
               <a:rPr lang="en-US" smtClean="0"/>
-              <a:t>11/4/2022</a:t>
+              <a:t>2/13/2023</a:t>
             </a:fld>
             <a:endParaRPr lang="en-US"/>
           </a:p>
@@ -1447,7 +1502,7 @@
           <a:p>
             <a:fld id="{7278FE79-C10B-4710-88A9-F314B59049B5}" type="datetimeFigureOut">
               <a:rPr lang="en-US" smtClean="0"/>
-              <a:t>11/4/2022</a:t>
+              <a:t>2/13/2023</a:t>
             </a:fld>
             <a:endParaRPr lang="en-US"/>
           </a:p>
@@ -1722,7 +1777,7 @@
           <a:p>
             <a:fld id="{7278FE79-C10B-4710-88A9-F314B59049B5}" type="datetimeFigureOut">
               <a:rPr lang="en-US" smtClean="0"/>
-              <a:t>11/4/2022</a:t>
+              <a:t>2/13/2023</a:t>
             </a:fld>
             <a:endParaRPr lang="en-US"/>
           </a:p>
@@ -1987,7 +2042,7 @@
           <a:p>
             <a:fld id="{7278FE79-C10B-4710-88A9-F314B59049B5}" type="datetimeFigureOut">
               <a:rPr lang="en-US" smtClean="0"/>
-              <a:t>11/4/2022</a:t>
+              <a:t>2/13/2023</a:t>
             </a:fld>
             <a:endParaRPr lang="en-US"/>
           </a:p>
@@ -2399,7 +2454,7 @@
           <a:p>
             <a:fld id="{7278FE79-C10B-4710-88A9-F314B59049B5}" type="datetimeFigureOut">
               <a:rPr lang="en-US" smtClean="0"/>
-              <a:t>11/4/2022</a:t>
+              <a:t>2/13/2023</a:t>
             </a:fld>
             <a:endParaRPr lang="en-US"/>
           </a:p>
@@ -2540,7 +2595,7 @@
           <a:p>
             <a:fld id="{7278FE79-C10B-4710-88A9-F314B59049B5}" type="datetimeFigureOut">
               <a:rPr lang="en-US" smtClean="0"/>
-              <a:t>11/4/2022</a:t>
+              <a:t>2/13/2023</a:t>
             </a:fld>
             <a:endParaRPr lang="en-US"/>
           </a:p>
@@ -2653,7 +2708,7 @@
           <a:p>
             <a:fld id="{7278FE79-C10B-4710-88A9-F314B59049B5}" type="datetimeFigureOut">
               <a:rPr lang="en-US" smtClean="0"/>
-              <a:t>11/4/2022</a:t>
+              <a:t>2/13/2023</a:t>
             </a:fld>
             <a:endParaRPr lang="en-US"/>
           </a:p>
@@ -2964,7 +3019,7 @@
           <a:p>
             <a:fld id="{7278FE79-C10B-4710-88A9-F314B59049B5}" type="datetimeFigureOut">
               <a:rPr lang="en-US" smtClean="0"/>
-              <a:t>11/4/2022</a:t>
+              <a:t>2/13/2023</a:t>
             </a:fld>
             <a:endParaRPr lang="en-US"/>
           </a:p>
@@ -3252,7 +3307,7 @@
           <a:p>
             <a:fld id="{7278FE79-C10B-4710-88A9-F314B59049B5}" type="datetimeFigureOut">
               <a:rPr lang="en-US" smtClean="0"/>
-              <a:t>11/4/2022</a:t>
+              <a:t>2/13/2023</a:t>
             </a:fld>
             <a:endParaRPr lang="en-US"/>
           </a:p>
@@ -3493,7 +3548,7 @@
           <a:p>
             <a:fld id="{7278FE79-C10B-4710-88A9-F314B59049B5}" type="datetimeFigureOut">
               <a:rPr lang="en-US" smtClean="0"/>
-              <a:t>11/4/2022</a:t>
+              <a:t>2/13/2023</a:t>
             </a:fld>
             <a:endParaRPr lang="en-US"/>
           </a:p>
@@ -6063,14 +6118,19 @@
             <p:ph type="title"/>
           </p:nvPr>
         </p:nvSpPr>
-        <p:spPr/>
+        <p:spPr>
+          <a:xfrm>
+            <a:off x="288757" y="365125"/>
+            <a:ext cx="11219447" cy="1325563"/>
+          </a:xfrm>
+        </p:spPr>
         <p:txBody>
           <a:bodyPr/>
           <a:lstStyle/>
           <a:p>
             <a:r>
               <a:rPr lang="en-US" dirty="0"/>
-              <a:t>Polymorphic functions</a:t>
+              <a:t>Type specification becomes a language in itself</a:t>
             </a:r>
           </a:p>
         </p:txBody>
@@ -6093,50 +6153,63 @@
         </p:nvSpPr>
         <p:spPr/>
         <p:txBody>
-          <a:bodyPr/>
+          <a:bodyPr>
+            <a:normAutofit fontScale="92500" lnSpcReduction="10000"/>
+          </a:bodyPr>
           <a:lstStyle/>
           <a:p>
             <a:pPr marL="0" indent="0">
               <a:buNone/>
             </a:pPr>
             <a:r>
-              <a:rPr lang="en-US" dirty="0"/>
-              <a:t>Consider this typed procedure:</a:t>
-            </a:r>
+              <a:rPr lang="en-US" sz="2000" b="1" dirty="0"/>
+              <a:t>Polymorphic Function with type variables, structure types</a:t>
+            </a:r>
+            <a:endParaRPr lang="en-US" sz="2000" b="1" dirty="0">
+              <a:latin typeface="Consolas" panose="020B0609020204030204" pitchFamily="49" charset="0"/>
+            </a:endParaRPr>
           </a:p>
           <a:p>
             <a:pPr marL="0" indent="0">
               <a:buNone/>
             </a:pPr>
+            <a:endParaRPr lang="en-US" sz="2000" dirty="0">
+              <a:latin typeface="Consolas" panose="020B0609020204030204" pitchFamily="49" charset="0"/>
+            </a:endParaRPr>
+          </a:p>
+          <a:p>
+            <a:pPr marL="0" indent="0">
+              <a:buNone/>
+            </a:pPr>
             <a:r>
               <a:rPr lang="en-US" sz="2000" dirty="0">
                 <a:latin typeface="Consolas" panose="020B0609020204030204" pitchFamily="49" charset="0"/>
               </a:rPr>
-              <a:t>(: </a:t>
+              <a:t>(: swap (All (a b) (-&gt; (</a:t>
             </a:r>
             <a:r>
               <a:rPr lang="en-US" sz="2000" dirty="0" err="1">
                 <a:latin typeface="Consolas" panose="020B0609020204030204" pitchFamily="49" charset="0"/>
               </a:rPr>
-              <a:t>firstNum</a:t>
+              <a:t>Pairof</a:t>
             </a:r>
             <a:r>
               <a:rPr lang="en-US" sz="2000" dirty="0">
                 <a:latin typeface="Consolas" panose="020B0609020204030204" pitchFamily="49" charset="0"/>
               </a:rPr>
-              <a:t> (-&gt; (</a:t>
+              <a:t> a b) (</a:t>
             </a:r>
             <a:r>
               <a:rPr lang="en-US" sz="2000" dirty="0" err="1">
                 <a:latin typeface="Consolas" panose="020B0609020204030204" pitchFamily="49" charset="0"/>
               </a:rPr>
-              <a:t>Listof</a:t>
+              <a:t>Pairof</a:t>
             </a:r>
             <a:r>
               <a:rPr lang="en-US" sz="2000" dirty="0">
                 <a:latin typeface="Consolas" panose="020B0609020204030204" pitchFamily="49" charset="0"/>
               </a:rPr>
-              <a:t> Number) Number))</a:t>
+              <a:t> b a))))</a:t>
             </a:r>
           </a:p>
           <a:p>
@@ -6147,135 +6220,109 @@
               <a:rPr lang="en-US" sz="2000" dirty="0">
                 <a:latin typeface="Consolas" panose="020B0609020204030204" pitchFamily="49" charset="0"/>
               </a:rPr>
-              <a:t>(define </a:t>
+              <a:t>(define swap</a:t>
+            </a:r>
+          </a:p>
+          <a:p>
+            <a:pPr marL="0" indent="0">
+              <a:buNone/>
+            </a:pPr>
+            <a:r>
+              <a:rPr lang="en-US" sz="2000" dirty="0">
+                <a:latin typeface="Consolas" panose="020B0609020204030204" pitchFamily="49" charset="0"/>
+              </a:rPr>
+              <a:t>  (lambda (pair)</a:t>
+            </a:r>
+          </a:p>
+          <a:p>
+            <a:pPr marL="0" indent="0">
+              <a:buNone/>
+            </a:pPr>
+            <a:r>
+              <a:rPr lang="en-US" sz="2000" dirty="0">
+                <a:latin typeface="Consolas" panose="020B0609020204030204" pitchFamily="49" charset="0"/>
+              </a:rPr>
+              <a:t>    (cons (</a:t>
             </a:r>
             <a:r>
               <a:rPr lang="en-US" sz="2000" dirty="0" err="1">
                 <a:latin typeface="Consolas" panose="020B0609020204030204" pitchFamily="49" charset="0"/>
               </a:rPr>
-              <a:t>firstNum</a:t>
-            </a:r>
-            <a:endParaRPr lang="en-US" sz="2000" dirty="0">
-              <a:latin typeface="Consolas" panose="020B0609020204030204" pitchFamily="49" charset="0"/>
-            </a:endParaRPr>
+              <a:t>cdr</a:t>
+            </a:r>
+            <a:r>
+              <a:rPr lang="en-US" sz="2000" dirty="0">
+                <a:latin typeface="Consolas" panose="020B0609020204030204" pitchFamily="49" charset="0"/>
+              </a:rPr>
+              <a:t> pair) (car pair))))</a:t>
+            </a:r>
+            <a:endParaRPr lang="en-US" sz="2000" dirty="0"/>
           </a:p>
           <a:p>
             <a:pPr marL="0" indent="0">
               <a:buNone/>
             </a:pPr>
+            <a:endParaRPr lang="en-US" sz="2000" dirty="0"/>
+          </a:p>
+          <a:p>
+            <a:pPr marL="0" indent="0">
+              <a:buNone/>
+            </a:pPr>
+            <a:r>
+              <a:rPr lang="en-US" sz="2000" b="1" dirty="0"/>
+              <a:t>“Maybe” type</a:t>
+            </a:r>
+          </a:p>
+          <a:p>
+            <a:pPr marL="0" indent="0">
+              <a:buNone/>
+            </a:pPr>
+            <a:endParaRPr lang="en-US" sz="2000" dirty="0"/>
+          </a:p>
+          <a:p>
+            <a:pPr marL="0" indent="0">
+              <a:buNone/>
+            </a:pPr>
             <a:r>
               <a:rPr lang="en-US" sz="2000" dirty="0">
                 <a:latin typeface="Consolas" panose="020B0609020204030204" pitchFamily="49" charset="0"/>
               </a:rPr>
-              <a:t>  (lambda (</a:t>
+              <a:t>(struct None ())</a:t>
+            </a:r>
+          </a:p>
+          <a:p>
+            <a:pPr marL="0" indent="0">
+              <a:buNone/>
+            </a:pPr>
+            <a:r>
+              <a:rPr lang="en-US" sz="2000" dirty="0">
+                <a:latin typeface="Consolas" panose="020B0609020204030204" pitchFamily="49" charset="0"/>
+              </a:rPr>
+              <a:t>(struct (a) Some ([v : a]))</a:t>
+            </a:r>
+          </a:p>
+          <a:p>
+            <a:pPr marL="0" indent="0">
+              <a:buNone/>
+            </a:pPr>
+            <a:r>
+              <a:rPr lang="en-US" sz="2000" dirty="0">
+                <a:latin typeface="Consolas" panose="020B0609020204030204" pitchFamily="49" charset="0"/>
+              </a:rPr>
+              <a:t>(define-type (</a:t>
             </a:r>
             <a:r>
               <a:rPr lang="en-US" sz="2000" dirty="0" err="1">
                 <a:latin typeface="Consolas" panose="020B0609020204030204" pitchFamily="49" charset="0"/>
               </a:rPr>
-              <a:t>lst</a:t>
+              <a:t>Opt</a:t>
             </a:r>
             <a:r>
               <a:rPr lang="en-US" sz="2000" dirty="0">
                 <a:latin typeface="Consolas" panose="020B0609020204030204" pitchFamily="49" charset="0"/>
               </a:rPr>
-              <a:t>)</a:t>
-            </a:r>
-          </a:p>
-          <a:p>
-            <a:pPr marL="0" indent="0">
-              <a:buNone/>
-            </a:pPr>
-            <a:r>
-              <a:rPr lang="en-US" sz="2000" dirty="0">
-                <a:latin typeface="Consolas" panose="020B0609020204030204" pitchFamily="49" charset="0"/>
-              </a:rPr>
-              <a:t>    (if (= 0 (length </a:t>
-            </a:r>
-            <a:r>
-              <a:rPr lang="en-US" sz="2000" dirty="0" err="1">
-                <a:latin typeface="Consolas" panose="020B0609020204030204" pitchFamily="49" charset="0"/>
-              </a:rPr>
-              <a:t>lst</a:t>
-            </a:r>
-            <a:r>
-              <a:rPr lang="en-US" sz="2000" dirty="0">
-                <a:latin typeface="Consolas" panose="020B0609020204030204" pitchFamily="49" charset="0"/>
-              </a:rPr>
-              <a:t>))</a:t>
-            </a:r>
-          </a:p>
-          <a:p>
-            <a:pPr marL="0" indent="0">
-              <a:buNone/>
-            </a:pPr>
-            <a:r>
-              <a:rPr lang="en-US" sz="2000" dirty="0">
-                <a:latin typeface="Consolas" panose="020B0609020204030204" pitchFamily="49" charset="0"/>
-              </a:rPr>
-              <a:t>        -1</a:t>
-            </a:r>
-          </a:p>
-          <a:p>
-            <a:pPr marL="0" indent="0">
-              <a:buNone/>
-            </a:pPr>
-            <a:r>
-              <a:rPr lang="en-US" sz="2000" dirty="0">
-                <a:latin typeface="Consolas" panose="020B0609020204030204" pitchFamily="49" charset="0"/>
-              </a:rPr>
-              <a:t>        (car </a:t>
-            </a:r>
-            <a:r>
-              <a:rPr lang="en-US" sz="2000" dirty="0" err="1">
-                <a:latin typeface="Consolas" panose="020B0609020204030204" pitchFamily="49" charset="0"/>
-              </a:rPr>
-              <a:t>lst</a:t>
-            </a:r>
-            <a:r>
-              <a:rPr lang="en-US" sz="2000" dirty="0">
-                <a:latin typeface="Consolas" panose="020B0609020204030204" pitchFamily="49" charset="0"/>
-              </a:rPr>
-              <a:t>))))</a:t>
-            </a:r>
-          </a:p>
-          <a:p>
-            <a:pPr marL="0" indent="0">
-              <a:buNone/>
-            </a:pPr>
-            <a:r>
-              <a:rPr lang="en-US" dirty="0"/>
-              <a:t>But what is the type of length? </a:t>
-            </a:r>
-          </a:p>
-          <a:p>
-            <a:pPr marL="0" indent="0">
-              <a:buNone/>
-            </a:pPr>
-            <a:r>
-              <a:rPr lang="en-US" dirty="0"/>
-              <a:t>(All (a) (-&gt; (</a:t>
-            </a:r>
-            <a:r>
-              <a:rPr lang="en-US" dirty="0" err="1"/>
-              <a:t>Listof</a:t>
-            </a:r>
-            <a:r>
-              <a:rPr lang="en-US" dirty="0"/>
-              <a:t> a) Index))</a:t>
-            </a:r>
-          </a:p>
-          <a:p>
-            <a:pPr marL="0" indent="0">
-              <a:buNone/>
-            </a:pPr>
-            <a:endParaRPr lang="en-US" dirty="0"/>
-          </a:p>
-          <a:p>
-            <a:pPr marL="0" indent="0">
-              <a:buNone/>
-            </a:pPr>
-            <a:endParaRPr lang="en-US" dirty="0"/>
+              <a:t> a) (U None (Some a)))</a:t>
+            </a:r>
           </a:p>
         </p:txBody>
       </p:sp>
@@ -6559,13 +6606,21 @@
           <a:p>
             <a:r>
               <a:rPr lang="en-US" dirty="0"/>
-              <a:t>Static type checking is another kind of thing we can do with parsed code</a:t>
+              <a:t>Static type checking is another kind of thing we can do with parsed code.  It can improve both safety and efficiency.</a:t>
             </a:r>
           </a:p>
           <a:p>
             <a:r>
               <a:rPr lang="en-US" dirty="0"/>
-              <a:t>The mechanisms by which we can infer stuff about the types of expressions are pretty robust</a:t>
+              <a:t>The basic algorithms of typing are pretty straightforward.  Things like polymorphic functions and </a:t>
+            </a:r>
+            <a:r>
+              <a:rPr lang="en-US"/>
+              <a:t>type-parameterized structures are </a:t>
+            </a:r>
+            <a:r>
+              <a:rPr lang="en-US" dirty="0"/>
+              <a:t>harder, but possible to deal with.</a:t>
             </a:r>
           </a:p>
           <a:p>
@@ -6577,7 +6632,7 @@
           <a:p>
             <a:r>
               <a:rPr lang="en-US" dirty="0"/>
-              <a:t>But (as with most kind of static checks) it can increase the complexity of writing code and even make certain kind of previously possible code impossible</a:t>
+              <a:t>But (as with most kind of static checks) it can increase the complexity of writing code and even make certain kind of previously possible code impossible (e.g. ifs with different types, heterogeneous lists)</a:t>
             </a:r>
           </a:p>
         </p:txBody>

</xml_diff>